<commit_message>
Le moví a los días de la presentación eses
</commit_message>
<xml_diff>
--- a/Documentacion/UPIIZ_PTLL_PresentaciónAprobaciónProyecto.pptx
+++ b/Documentacion/UPIIZ_PTLL_PresentaciónAprobaciónProyecto.pptx
@@ -153,7 +153,7 @@
   </p:defaultTextStyle>
   <p:extLst>
     <p:ext uri="{EFAFB233-063F-42B5-8137-9DF3F51BA10A}">
-      <p15:sldGuideLst xmlns:p15="http://schemas.microsoft.com/office/powerpoint/2012/main">
+      <p15:sldGuideLst xmlns:p15="http://schemas.microsoft.com/office/powerpoint/2012/main" xmlns="">
         <p15:guide id="1" orient="horz" pos="2160">
           <p15:clr>
             <a:srgbClr val="A4A3A4"/>
@@ -292,7 +292,7 @@
               <a:pPr>
                 <a:defRPr/>
               </a:pPr>
-              <a:t>20/02/2015</a:t>
+              <a:t>22/02/2015</a:t>
             </a:fld>
             <a:endParaRPr lang="es-ES"/>
           </a:p>
@@ -521,7 +521,7 @@
               <a:pPr>
                 <a:defRPr/>
               </a:pPr>
-              <a:t>20/02/2015</a:t>
+              <a:t>22/02/2015</a:t>
             </a:fld>
             <a:endParaRPr lang="es-PE"/>
           </a:p>
@@ -1684,7 +1684,7 @@
               <a:pPr>
                 <a:defRPr/>
               </a:pPr>
-              <a:t>20/02/2015</a:t>
+              <a:t>22/02/2015</a:t>
             </a:fld>
             <a:endParaRPr lang="es-PE"/>
           </a:p>
@@ -1895,7 +1895,7 @@
               <a:pPr>
                 <a:defRPr/>
               </a:pPr>
-              <a:t>20/02/2015</a:t>
+              <a:t>22/02/2015</a:t>
             </a:fld>
             <a:endParaRPr lang="es-PE"/>
           </a:p>
@@ -2095,7 +2095,7 @@
               <a:pPr>
                 <a:defRPr/>
               </a:pPr>
-              <a:t>20/02/2015</a:t>
+              <a:t>22/02/2015</a:t>
             </a:fld>
             <a:endParaRPr lang="es-PE"/>
           </a:p>
@@ -2260,7 +2260,7 @@
               <a:pPr>
                 <a:defRPr/>
               </a:pPr>
-              <a:t>20/02/2015</a:t>
+              <a:t>22/02/2015</a:t>
             </a:fld>
             <a:endParaRPr lang="es-PE"/>
           </a:p>
@@ -2530,7 +2530,7 @@
               <a:pPr>
                 <a:defRPr/>
               </a:pPr>
-              <a:t>20/02/2015</a:t>
+              <a:t>22/02/2015</a:t>
             </a:fld>
             <a:endParaRPr lang="es-PE"/>
           </a:p>
@@ -2954,7 +2954,7 @@
               <a:pPr>
                 <a:defRPr/>
               </a:pPr>
-              <a:t>20/02/2015</a:t>
+              <a:t>22/02/2015</a:t>
             </a:fld>
             <a:endParaRPr lang="es-PE"/>
           </a:p>
@@ -3415,7 +3415,7 @@
               <a:pPr>
                 <a:defRPr/>
               </a:pPr>
-              <a:t>20/02/2015</a:t>
+              <a:t>22/02/2015</a:t>
             </a:fld>
             <a:endParaRPr lang="es-PE"/>
           </a:p>
@@ -3531,7 +3531,7 @@
               <a:pPr>
                 <a:defRPr/>
               </a:pPr>
-              <a:t>20/02/2015</a:t>
+              <a:t>22/02/2015</a:t>
             </a:fld>
             <a:endParaRPr lang="es-PE"/>
           </a:p>
@@ -3667,7 +3667,7 @@
               <a:pPr>
                 <a:defRPr/>
               </a:pPr>
-              <a:t>20/02/2015</a:t>
+              <a:t>22/02/2015</a:t>
             </a:fld>
             <a:endParaRPr lang="es-PE"/>
           </a:p>
@@ -3956,7 +3956,7 @@
               <a:pPr>
                 <a:defRPr/>
               </a:pPr>
-              <a:t>20/02/2015</a:t>
+              <a:t>22/02/2015</a:t>
             </a:fld>
             <a:endParaRPr lang="es-PE"/>
           </a:p>
@@ -4176,7 +4176,7 @@
               <a:pPr>
                 <a:defRPr/>
               </a:pPr>
-              <a:t>20/02/2015</a:t>
+              <a:t>22/02/2015</a:t>
             </a:fld>
             <a:endParaRPr lang="es-PE"/>
           </a:p>
@@ -5300,7 +5300,7 @@
               <a:pPr>
                 <a:defRPr/>
               </a:pPr>
-              <a:t>20/02/2015</a:t>
+              <a:t>22/02/2015</a:t>
             </a:fld>
             <a:endParaRPr lang="es-PE"/>
           </a:p>
@@ -8169,7 +8169,7 @@
           <a:graphicData uri="http://schemas.openxmlformats.org/presentationml/2006/ole">
             <mc:AlternateContent xmlns:mc="http://schemas.openxmlformats.org/markup-compatibility/2006">
               <mc:Choice xmlns:v="urn:schemas-microsoft-com:vml" Requires="v">
-                <p:oleObj spid="_x0000_s2062" name="Hoja de cálculo" r:id="rId4" imgW="8001047" imgH="6667629" progId="Excel.Sheet.12">
+                <p:oleObj spid="_x0000_s2063" name="Hoja de cálculo" r:id="rId4" imgW="8001047" imgH="6667629" progId="Excel.Sheet.12">
                   <p:embed/>
                 </p:oleObj>
               </mc:Choice>
@@ -9562,7 +9562,11 @@
             </a:pPr>
             <a:r>
               <a:rPr lang="es-MX" dirty="0" smtClean="0"/>
-              <a:t>Miércoles 25 de Noviembre del 2015.</a:t>
+              <a:t>Jueves 30 de Julio del </a:t>
+            </a:r>
+            <a:r>
+              <a:rPr lang="es-MX" dirty="0" smtClean="0"/>
+              <a:t>2015.</a:t>
             </a:r>
             <a:endParaRPr lang="es-MX" dirty="0"/>
           </a:p>
@@ -10846,28 +10850,28 @@
               <a:defRPr/>
             </a:pPr>
             <a:r>
+              <a:rPr lang="es-MX" sz="2400" b="1" smtClean="0">
+                <a:solidFill>
+                  <a:srgbClr val="943634"/>
+                </a:solidFill>
+              </a:rPr>
+              <a:t>42.63 </a:t>
+            </a:r>
+            <a:r>
+              <a:rPr lang="es-MX" sz="2400" b="1" smtClean="0">
+                <a:solidFill>
+                  <a:srgbClr val="943634"/>
+                </a:solidFill>
+              </a:rPr>
+              <a:t>días </a:t>
+            </a:r>
+            <a:r>
               <a:rPr lang="es-MX" sz="2400" b="1" dirty="0" smtClean="0">
                 <a:solidFill>
                   <a:srgbClr val="943634"/>
                 </a:solidFill>
               </a:rPr>
-              <a:t>65 </a:t>
-            </a:r>
-            <a:r>
-              <a:rPr lang="es-MX" sz="2400" b="1" dirty="0">
-                <a:solidFill>
-                  <a:srgbClr val="943634"/>
-                </a:solidFill>
-              </a:rPr>
-              <a:t>d</a:t>
-            </a:r>
-            <a:r>
-              <a:rPr lang="es-MX" sz="2400" b="1" dirty="0" smtClean="0">
-                <a:solidFill>
-                  <a:srgbClr val="943634"/>
-                </a:solidFill>
-              </a:rPr>
-              <a:t>ías en total del proyecto</a:t>
+              <a:t>en total del proyecto</a:t>
             </a:r>
             <a:endParaRPr lang="es-MX" dirty="0"/>
           </a:p>

</xml_diff>